<commit_message>
Revisions to the presentation.
</commit_message>
<xml_diff>
--- a/gensim_presentation_wb.pptx
+++ b/gensim_presentation_wb.pptx
@@ -1354,29 +1354,7 @@
                 <a:ea typeface="+mn-ea"/>
                 <a:cs typeface="+mn-cs"/>
               </a:rPr>
-              <a:t> In</a:t>
-            </a:r>
-            <a:r>
-              <a:rPr lang="en-US" sz="1200" b="0" kern="1200" baseline="0" smtClean="0">
-                <a:solidFill>
-                  <a:schemeClr val="tx1"/>
-                </a:solidFill>
-                <a:latin typeface="+mn-lt"/>
-                <a:ea typeface="+mn-ea"/>
-                <a:cs typeface="+mn-cs"/>
-              </a:rPr>
-              <a:t> gensim, “</a:t>
-            </a:r>
-            <a:r>
-              <a:rPr lang="en-US" sz="1200" b="0" kern="1200" smtClean="0">
-                <a:solidFill>
-                  <a:schemeClr val="tx1"/>
-                </a:solidFill>
-                <a:latin typeface="+mn-lt"/>
-                <a:ea typeface="+mn-ea"/>
-                <a:cs typeface="+mn-cs"/>
-              </a:rPr>
-              <a:t>a 'transformation' is any object which accepts a sparse document via dictionary notation and returns another sparse document.”</a:t>
+              <a:t>A gensim 'transformation' is any object which accepts a sparse document via dictionary notation and returns another sparse document.”</a:t>
             </a:r>
           </a:p>
           <a:p>
@@ -1659,7 +1637,7 @@
                 <a:ea typeface="+mn-ea"/>
                 <a:cs typeface="+mn-cs"/>
               </a:rPr>
-              <a:t>so we realize a TFIDF transformation from the corpus we just generated (wiki_corpus).</a:t>
+              <a:t>so we realize a TFIDF transformation from the corpus we just generated,</a:t>
             </a:r>
             <a:r>
               <a:rPr lang="en-US" sz="1200" b="0" kern="1200" baseline="0" smtClean="0">
@@ -1672,25 +1650,17 @@
               </a:rPr>
               <a:t> </a:t>
             </a:r>
-          </a:p>
-          <a:p>
-            <a:pPr marL="0" marR="0" indent="0" algn="l" defTabSz="457200" rtl="0" eaLnBrk="1" fontAlgn="auto" latinLnBrk="0" hangingPunct="1">
-              <a:lnSpc>
-                <a:spcPct val="100000"/>
-              </a:lnSpc>
-              <a:spcBef>
-                <a:spcPts val="0"/>
-              </a:spcBef>
-              <a:spcAft>
-                <a:spcPts val="0"/>
-              </a:spcAft>
-              <a:buClrTx/>
-              <a:buSzTx/>
-              <a:buFontTx/>
-              <a:buNone/>
-              <a:tabLst/>
-              <a:defRPr/>
-            </a:pPr>
+            <a:r>
+              <a:rPr lang="en-US" sz="1200" b="0" kern="1200" smtClean="0">
+                <a:solidFill>
+                  <a:schemeClr val="tx1"/>
+                </a:solidFill>
+                <a:latin typeface="+mn-lt"/>
+                <a:ea typeface="+mn-ea"/>
+                <a:cs typeface="+mn-cs"/>
+              </a:rPr>
+              <a:t>wiki_corpus.</a:t>
+            </a:r>
             <a:r>
               <a:rPr lang="en-US" sz="1200" b="0" kern="1200" baseline="0" smtClean="0">
                 <a:solidFill>
@@ -1700,37 +1670,7 @@
                 <a:ea typeface="+mn-ea"/>
                 <a:cs typeface="+mn-cs"/>
               </a:rPr>
-              <a:t>num_docs is number of documents in dictionary</a:t>
-            </a:r>
-          </a:p>
-          <a:p>
-            <a:pPr marL="0" marR="0" indent="0" algn="l" defTabSz="457200" rtl="0" eaLnBrk="1" fontAlgn="auto" latinLnBrk="0" hangingPunct="1">
-              <a:lnSpc>
-                <a:spcPct val="100000"/>
-              </a:lnSpc>
-              <a:spcBef>
-                <a:spcPts val="0"/>
-              </a:spcBef>
-              <a:spcAft>
-                <a:spcPts val="0"/>
-              </a:spcAft>
-              <a:buClrTx/>
-              <a:buSzTx/>
-              <a:buFontTx/>
-              <a:buNone/>
-              <a:tabLst/>
-              <a:defRPr/>
-            </a:pPr>
-            <a:r>
-              <a:rPr lang="en-US" sz="1200" b="0" kern="1200" baseline="0" smtClean="0">
-                <a:solidFill>
-                  <a:schemeClr val="tx1"/>
-                </a:solidFill>
-                <a:latin typeface="+mn-lt"/>
-                <a:ea typeface="+mn-ea"/>
-                <a:cs typeface="+mn-cs"/>
-              </a:rPr>
-              <a:t>num_nnz is number of non-zeroes in the matrix</a:t>
+              <a:t> This also takes several hours to generate for wikipedia.</a:t>
             </a:r>
           </a:p>
           <a:p>
@@ -1787,7 +1727,37 @@
                 <a:ea typeface="+mn-ea"/>
                 <a:cs typeface="+mn-cs"/>
               </a:rPr>
-              <a:t>Also takes several hours to generate for wikipedia.</a:t>
+              <a:t>num_docs is number of documents in dictionary.</a:t>
+            </a:r>
+          </a:p>
+          <a:p>
+            <a:pPr marL="0" marR="0" indent="0" algn="l" defTabSz="457200" rtl="0" eaLnBrk="1" fontAlgn="auto" latinLnBrk="0" hangingPunct="1">
+              <a:lnSpc>
+                <a:spcPct val="100000"/>
+              </a:lnSpc>
+              <a:spcBef>
+                <a:spcPts val="0"/>
+              </a:spcBef>
+              <a:spcAft>
+                <a:spcPts val="0"/>
+              </a:spcAft>
+              <a:buClrTx/>
+              <a:buSzTx/>
+              <a:buFontTx/>
+              <a:buNone/>
+              <a:tabLst/>
+              <a:defRPr/>
+            </a:pPr>
+            <a:r>
+              <a:rPr lang="en-US" sz="1200" b="0" kern="1200" baseline="0" smtClean="0">
+                <a:solidFill>
+                  <a:schemeClr val="tx1"/>
+                </a:solidFill>
+                <a:latin typeface="+mn-lt"/>
+                <a:ea typeface="+mn-ea"/>
+                <a:cs typeface="+mn-cs"/>
+              </a:rPr>
+              <a:t>num_nnz is number of non-zeroes in the matrix.</a:t>
             </a:r>
           </a:p>
           <a:p>
@@ -2343,6 +2313,28 @@
                 <a:ea typeface="+mn-ea"/>
                 <a:cs typeface="+mn-cs"/>
               </a:rPr>
+              <a:t>Here again are the topics</a:t>
+            </a:r>
+            <a:r>
+              <a:rPr lang="en-US" sz="1200" kern="1200" baseline="0" smtClean="0">
+                <a:solidFill>
+                  <a:schemeClr val="tx1"/>
+                </a:solidFill>
+                <a:latin typeface="+mn-lt"/>
+                <a:ea typeface="+mn-ea"/>
+                <a:cs typeface="+mn-cs"/>
+              </a:rPr>
+              <a:t> we saw. These were generated by LSI from Wikipedia articles. </a:t>
+            </a:r>
+            <a:r>
+              <a:rPr lang="en-US" sz="1200" kern="1200" smtClean="0">
+                <a:solidFill>
+                  <a:schemeClr val="tx1"/>
+                </a:solidFill>
+                <a:latin typeface="+mn-lt"/>
+                <a:ea typeface="+mn-ea"/>
+                <a:cs typeface="+mn-cs"/>
+              </a:rPr>
               <a:t>What </a:t>
             </a:r>
             <a:r>
@@ -2365,7 +2357,7 @@
                 <a:ea typeface="+mn-ea"/>
                 <a:cs typeface="+mn-cs"/>
               </a:rPr>
-              <a:t>these topics? In one sense, I don't know. The</a:t>
+              <a:t>these topics? It’s hard to say, exactly. The</a:t>
             </a:r>
             <a:r>
               <a:rPr lang="en-US" sz="1200" i="0" kern="1200" baseline="0" smtClean="0">
@@ -2376,7 +2368,7 @@
                 <a:ea typeface="+mn-ea"/>
                 <a:cs typeface="+mn-cs"/>
               </a:rPr>
-              <a:t> “themes” are unclear. </a:t>
+              <a:t> “themes” are unclear. But </a:t>
             </a:r>
             <a:r>
               <a:rPr lang="en-US" sz="1200" i="0" kern="1200" smtClean="0">
@@ -2387,7 +2379,7 @@
                 <a:ea typeface="+mn-ea"/>
                 <a:cs typeface="+mn-cs"/>
               </a:rPr>
-              <a:t>B</a:t>
+              <a:t>t</a:t>
             </a:r>
             <a:r>
               <a:rPr lang="en-US" sz="1200" i="0" kern="1200" baseline="0" smtClean="0">
@@ -2398,7 +2390,7 @@
                 <a:ea typeface="+mn-ea"/>
                 <a:cs typeface="+mn-cs"/>
               </a:rPr>
-              <a:t>ut they are in some sense</a:t>
+              <a:t>hey are in some sense</a:t>
             </a:r>
             <a:r>
               <a:rPr lang="en-US" sz="1200" i="0" kern="1200" smtClean="0">
@@ -2643,7 +2635,7 @@
                 <a:ea typeface="+mn-ea"/>
                 <a:cs typeface="+mn-cs"/>
               </a:rPr>
-              <a:t> number of dimensions and keep the most information for a given number of topics. I don't know the math. When I read the papers I kind of nod</a:t>
+              <a:t> number of dimensions and keep the most information for a given number of topics. I understand the technique conceptually but I’m not going to</a:t>
             </a:r>
             <a:r>
               <a:rPr lang="en-US" sz="1200" kern="1200" baseline="0" smtClean="0">
@@ -2654,7 +2646,7 @@
                 <a:ea typeface="+mn-ea"/>
                 <a:cs typeface="+mn-cs"/>
               </a:rPr>
-              <a:t> </a:t>
+              <a:t> try to get into the math behind it because I don’t really understand it well enough to explain it</a:t>
             </a:r>
             <a:r>
               <a:rPr lang="en-US" sz="1200" kern="1200" smtClean="0">
@@ -2665,7 +2657,7 @@
                 <a:ea typeface="+mn-ea"/>
                 <a:cs typeface="+mn-cs"/>
               </a:rPr>
-              <a:t>and almost thinking I understand it, but I haven't studied it. There</a:t>
+              <a:t>, and there</a:t>
             </a:r>
             <a:r>
               <a:rPr lang="en-US" sz="1200" kern="1200" baseline="0" smtClean="0">
@@ -2676,7 +2668,7 @@
                 <a:ea typeface="+mn-ea"/>
                 <a:cs typeface="+mn-cs"/>
               </a:rPr>
-              <a:t> are plenty of resources online to explain it. Nonetheless, I’ll at least describe it: </a:t>
+              <a:t> are plenty of resources online that explain it in great and accurate detail. Nonetheless, I’ll at least describe it briefly: </a:t>
             </a:r>
           </a:p>
           <a:p>
@@ -2733,7 +2725,7 @@
                 <a:ea typeface="+mn-ea"/>
                 <a:cs typeface="+mn-cs"/>
               </a:rPr>
-              <a:t>Briefly, SVD decomposes the word/document matrix into three simpler matrices. </a:t>
+              <a:t>SVD decomposes the word/document matrix into three simpler matrices. </a:t>
             </a:r>
           </a:p>
           <a:p>
@@ -2790,7 +2782,7 @@
                 <a:ea typeface="+mn-ea"/>
                 <a:cs typeface="+mn-cs"/>
               </a:rPr>
-              <a:t>Full rank SVD recreates the underlying matrix exactly, but LSA uses lower-order SVD, which provides the best (in the sense of least square error) approximation of the matrix. It</a:t>
+              <a:t>Full rank SVD will recreate the underlying matrix exactly, but LSA uses lower-order SVD, which provides the best (in the sense of least square error) approximation of the matrix at lower dimensions. By lowering the rank, </a:t>
             </a:r>
             <a:r>
               <a:rPr lang="en-US" sz="1200" kern="1200" smtClean="0">
@@ -2801,6 +2793,28 @@
                 <a:ea typeface="+mn-ea"/>
                 <a:cs typeface="+mn-cs"/>
               </a:rPr>
+              <a:t>dimensions associated with terms that have similar meanings are merged together</a:t>
+            </a:r>
+            <a:r>
+              <a:rPr lang="en-US" sz="1200" kern="1200" baseline="0" smtClean="0">
+                <a:solidFill>
+                  <a:schemeClr val="tx1"/>
+                </a:solidFill>
+                <a:latin typeface="+mn-lt"/>
+                <a:ea typeface="+mn-ea"/>
+                <a:cs typeface="+mn-cs"/>
+              </a:rPr>
+              <a:t>. This</a:t>
+            </a:r>
+            <a:r>
+              <a:rPr lang="en-US" sz="1200" kern="1200" smtClean="0">
+                <a:solidFill>
+                  <a:schemeClr val="tx1"/>
+                </a:solidFill>
+                <a:latin typeface="+mn-lt"/>
+                <a:ea typeface="+mn-ea"/>
+                <a:cs typeface="+mn-cs"/>
+              </a:rPr>
               <a:t> preserves the most important semantic information in the text while reducing noise, and </a:t>
             </a:r>
             <a:r>
@@ -2812,29 +2826,7 @@
                 <a:ea typeface="+mn-ea"/>
                 <a:cs typeface="+mn-cs"/>
               </a:rPr>
-              <a:t>can uncover interesting relationships among the data of the underlying matrix. By lowering the rank, it </a:t>
-            </a:r>
-            <a:r>
-              <a:rPr lang="en-US" sz="1200" kern="1200" smtClean="0">
-                <a:solidFill>
-                  <a:schemeClr val="tx1"/>
-                </a:solidFill>
-                <a:latin typeface="+mn-lt"/>
-                <a:ea typeface="+mn-ea"/>
-                <a:cs typeface="+mn-cs"/>
-              </a:rPr>
-              <a:t>merges dimensions associated with terms that have similar meanings</a:t>
-            </a:r>
-            <a:r>
-              <a:rPr lang="en-US" sz="1200" kern="1200" baseline="0" smtClean="0">
-                <a:solidFill>
-                  <a:schemeClr val="tx1"/>
-                </a:solidFill>
-                <a:latin typeface="+mn-lt"/>
-                <a:ea typeface="+mn-ea"/>
-                <a:cs typeface="+mn-cs"/>
-              </a:rPr>
-              <a:t>. </a:t>
+              <a:t>can uncover interesting relationships among the data of the underlying matrix. </a:t>
             </a:r>
           </a:p>
           <a:p>
@@ -2891,7 +2883,7 @@
                 <a:ea typeface="+mn-ea"/>
                 <a:cs typeface="+mn-cs"/>
               </a:rPr>
-              <a:t>Still the meaning</a:t>
+              <a:t>Still,</a:t>
             </a:r>
             <a:r>
               <a:rPr lang="en-US" sz="1200" kern="1200" baseline="0" smtClean="0">
@@ -2902,7 +2894,29 @@
                 <a:ea typeface="+mn-ea"/>
                 <a:cs typeface="+mn-cs"/>
               </a:rPr>
-              <a:t> of the terms is not really apparent to us. </a:t>
+              <a:t> t</a:t>
+            </a:r>
+            <a:r>
+              <a:rPr lang="en-US" sz="1200" kern="1200" smtClean="0">
+                <a:solidFill>
+                  <a:schemeClr val="tx1"/>
+                </a:solidFill>
+                <a:latin typeface="+mn-lt"/>
+                <a:ea typeface="+mn-ea"/>
+                <a:cs typeface="+mn-cs"/>
+              </a:rPr>
+              <a:t>he meaning</a:t>
+            </a:r>
+            <a:r>
+              <a:rPr lang="en-US" sz="1200" kern="1200" baseline="0" smtClean="0">
+                <a:solidFill>
+                  <a:schemeClr val="tx1"/>
+                </a:solidFill>
+                <a:latin typeface="+mn-lt"/>
+                <a:ea typeface="+mn-ea"/>
+                <a:cs typeface="+mn-cs"/>
+              </a:rPr>
+              <a:t> of the terms and topics is not really apparent to us. </a:t>
             </a:r>
             <a:r>
               <a:rPr lang="en-US" sz="1200" b="0" kern="1200" baseline="0" smtClean="0">
@@ -2946,7 +2960,7 @@
                 <a:ea typeface="+mn-ea"/>
                 <a:cs typeface="+mn-cs"/>
               </a:rPr>
-              <a:t>negative values, which cancel each other out delicately when generating vectors for new documents.</a:t>
+              <a:t>negative values, which cancel each other out delicately when generating vectors for documents.</a:t>
             </a:r>
             <a:r>
               <a:rPr lang="en-US" sz="1200" b="0" kern="1200" baseline="0" smtClean="0">
@@ -2980,71 +2994,6 @@
                 <a:cs typeface="+mn-cs"/>
               </a:rPr>
               <a:t> </a:t>
-            </a:r>
-            <a:endParaRPr lang="en-US" sz="1200" kern="1200" baseline="0" smtClean="0">
-              <a:solidFill>
-                <a:schemeClr val="tx1"/>
-              </a:solidFill>
-              <a:latin typeface="+mn-lt"/>
-              <a:ea typeface="+mn-ea"/>
-              <a:cs typeface="+mn-cs"/>
-            </a:endParaRPr>
-          </a:p>
-          <a:p>
-            <a:pPr marL="0" marR="0" indent="0" algn="l" defTabSz="457200" rtl="0" eaLnBrk="1" fontAlgn="auto" latinLnBrk="0" hangingPunct="1">
-              <a:lnSpc>
-                <a:spcPct val="100000"/>
-              </a:lnSpc>
-              <a:spcBef>
-                <a:spcPts val="0"/>
-              </a:spcBef>
-              <a:spcAft>
-                <a:spcPts val="0"/>
-              </a:spcAft>
-              <a:buClrTx/>
-              <a:buSzTx/>
-              <a:buFontTx/>
-              <a:buNone/>
-              <a:tabLst/>
-              <a:defRPr/>
-            </a:pPr>
-            <a:endParaRPr lang="en-US" sz="1200" kern="1200" baseline="0" smtClean="0">
-              <a:solidFill>
-                <a:schemeClr val="tx1"/>
-              </a:solidFill>
-              <a:latin typeface="+mn-lt"/>
-              <a:ea typeface="+mn-ea"/>
-              <a:cs typeface="+mn-cs"/>
-            </a:endParaRPr>
-          </a:p>
-          <a:p>
-            <a:pPr marL="0" marR="0" indent="0" algn="l" defTabSz="457200" rtl="0" eaLnBrk="1" fontAlgn="auto" latinLnBrk="0" hangingPunct="1">
-              <a:lnSpc>
-                <a:spcPct val="100000"/>
-              </a:lnSpc>
-              <a:spcBef>
-                <a:spcPts val="0"/>
-              </a:spcBef>
-              <a:spcAft>
-                <a:spcPts val="0"/>
-              </a:spcAft>
-              <a:buClrTx/>
-              <a:buSzTx/>
-              <a:buFontTx/>
-              <a:buNone/>
-              <a:tabLst/>
-              <a:defRPr/>
-            </a:pPr>
-            <a:r>
-              <a:rPr lang="en-US" sz="1200" kern="1200" baseline="0" smtClean="0">
-                <a:solidFill>
-                  <a:schemeClr val="tx1"/>
-                </a:solidFill>
-                <a:latin typeface="+mn-lt"/>
-                <a:ea typeface="+mn-ea"/>
-                <a:cs typeface="+mn-cs"/>
-              </a:rPr>
-              <a:t>The new dimensionality of the space is the number of topics, and gensim will use these topics to plot the vectors of documents in this space.</a:t>
             </a:r>
           </a:p>
           <a:p>
@@ -3819,7 +3768,7 @@
                 <a:ea typeface="+mn-ea"/>
                 <a:cs typeface="+mn-cs"/>
               </a:rPr>
-              <a:t> model, asking for 400 topics (</a:t>
+              <a:t> model, asking for 400 topics. Interesting note: </a:t>
             </a:r>
             <a:r>
               <a:rPr lang="en-US" sz="1200" kern="1200" smtClean="0">
@@ -3852,7 +3801,7 @@
                 <a:ea typeface="+mn-ea"/>
                 <a:cs typeface="+mn-cs"/>
               </a:rPr>
-              <a:t>between 200 and 500)</a:t>
+              <a:t>between 200 and 500.</a:t>
             </a:r>
           </a:p>
           <a:p>
@@ -5064,7 +5013,7 @@
             </a:r>
             <a:r>
               <a:rPr lang="en-US" baseline="0" dirty="0" smtClean="0"/>
-              <a:t> quick demo app. Please go to the address you see up there. You’ll be invited to submit a sentence, particularly a statement or fact that has a mixture of nouns, verbs, and adjectives. There’s some examples of the kinds of sentence that might work well with this demo, but take a moment to think of a sentence of your own and go ahead and submit. We should see them pop up here on the visualization screen.</a:t>
+              <a:t> quick demo app. Please go to the address you see up there. Hookbox somtimes takes several seconds to connect to the channel, so give it some if it’s red. It will turn green. You’ll be invited to submit a sentence, particularly a statement or fact that has a mixture of nouns, verbs, and adjectives. There’s some examples of the kinds of sentence that might work well with this demo, but take a moment to think of a sentence of your own and go ahead and submit. We should see them pop up here on the visualization screen.</a:t>
             </a:r>
           </a:p>
           <a:p>
@@ -7296,7 +7245,7 @@
             </a:pPr>
             <a:r>
               <a:rPr lang="en-US" baseline="0" smtClean="0"/>
-              <a:t>Topic modelling is still very new to me and I’m constantly learning more about it so my knowledge is still growing, especially when it comes to the math, but I’m really fascinated by it and trying to learn more by working with it and by doing things like this presentation.</a:t>
+              <a:t>Topic modelling is still pretty new to me and I’m constantly learning more about it so my knowledge is still growing, but I’m really fascinated by it and trying to learn more by working with it a lot, and by doing things like this presentation.</a:t>
             </a:r>
             <a:endParaRPr lang="en-US" sz="1200" kern="1200" smtClean="0">
               <a:solidFill>
@@ -14059,7 +14008,7 @@
         </p:nvSpPr>
         <p:spPr>
           <a:xfrm>
-            <a:off x="1222610" y="3876436"/>
+            <a:off x="1222610" y="3809588"/>
             <a:ext cx="2502157" cy="523220"/>
           </a:xfrm>
           <a:prstGeom prst="rect">
@@ -14097,7 +14046,7 @@
         </p:nvSpPr>
         <p:spPr>
           <a:xfrm>
-            <a:off x="1231852" y="5323924"/>
+            <a:off x="1231852" y="5257076"/>
             <a:ext cx="7108821" cy="954107"/>
           </a:xfrm>
           <a:prstGeom prst="rect">
@@ -14250,7 +14199,7 @@
         </p:nvSpPr>
         <p:spPr>
           <a:xfrm>
-            <a:off x="1250423" y="4533352"/>
+            <a:off x="1250423" y="4466504"/>
             <a:ext cx="7910286" cy="707886"/>
           </a:xfrm>
           <a:prstGeom prst="rect">
@@ -16699,7 +16648,7 @@
         <p:spPr>
           <a:xfrm>
             <a:off x="1233714" y="1209524"/>
-            <a:ext cx="4693061" cy="954107"/>
+            <a:ext cx="5293211" cy="954107"/>
           </a:xfrm>
           <a:prstGeom prst="rect">
             <a:avLst/>
@@ -16718,7 +16667,7 @@
                   <a:srgbClr val="A0D3E0"/>
                 </a:solidFill>
               </a:rPr>
-              <a:t>please go to http://ADDRESS </a:t>
+              <a:t>please go to http://192.168.1.116 </a:t>
             </a:r>
           </a:p>
           <a:p>
@@ -17609,6 +17558,13 @@
   <p:clrMapOvr>
     <a:masterClrMapping/>
   </p:clrMapOvr>
+  <p:timing>
+    <p:tnLst>
+      <p:par>
+        <p:cTn id="1" dur="indefinite" restart="never" nodeType="tmRoot"/>
+      </p:par>
+    </p:tnLst>
+  </p:timing>
 </p:sld>
 </file>
 
@@ -19388,7 +19344,7 @@
         <p:spPr>
           <a:xfrm>
             <a:off x="1386114" y="2387571"/>
-            <a:ext cx="7262354" cy="2246769"/>
+            <a:ext cx="7262354" cy="2862322"/>
           </a:xfrm>
           <a:prstGeom prst="rect">
             <a:avLst/>
@@ -19401,6 +19357,11 @@
           </a:bodyPr>
           <a:lstStyle/>
           <a:p>
+            <a:pPr>
+              <a:spcAft>
+                <a:spcPts val="1200"/>
+              </a:spcAft>
+            </a:pPr>
             <a:r>
               <a:rPr lang="en-US" sz="2800" smtClean="0">
                 <a:solidFill>
@@ -19412,6 +19373,9 @@
           </a:p>
           <a:p>
             <a:pPr>
+              <a:spcAft>
+                <a:spcPts val="1200"/>
+              </a:spcAft>
               <a:buFont typeface="Arial"/>
               <a:buChar char="•"/>
             </a:pPr>
@@ -19426,6 +19390,9 @@
           </a:p>
           <a:p>
             <a:pPr>
+              <a:spcAft>
+                <a:spcPts val="1200"/>
+              </a:spcAft>
               <a:buFont typeface="Arial"/>
               <a:buChar char="•"/>
             </a:pPr>
@@ -19440,6 +19407,9 @@
           </a:p>
           <a:p>
             <a:pPr>
+              <a:spcAft>
+                <a:spcPts val="1200"/>
+              </a:spcAft>
               <a:buFont typeface="Arial"/>
               <a:buChar char="•"/>
             </a:pPr>
@@ -19454,6 +19424,9 @@
           </a:p>
           <a:p>
             <a:pPr>
+              <a:spcAft>
+                <a:spcPts val="1200"/>
+              </a:spcAft>
               <a:buFont typeface="Arial"/>
               <a:buChar char="•"/>
             </a:pPr>
@@ -19548,7 +19521,7 @@
         <p:spPr>
           <a:xfrm>
             <a:off x="1233714" y="3695164"/>
-            <a:ext cx="6791268" cy="1815882"/>
+            <a:ext cx="6791268" cy="1969770"/>
           </a:xfrm>
           <a:prstGeom prst="rect">
             <a:avLst/>
@@ -19561,6 +19534,11 @@
           </a:bodyPr>
           <a:lstStyle/>
           <a:p>
+            <a:pPr>
+              <a:spcAft>
+                <a:spcPts val="1200"/>
+              </a:spcAft>
+            </a:pPr>
             <a:r>
               <a:rPr lang="en-US" sz="2800" dirty="0" smtClean="0">
                 <a:solidFill>

</xml_diff>